<commit_message>
Final draft of Stream Analytics slides
</commit_message>
<xml_diff>
--- a/Workshop/Content/5. Stream Analytics/Azure Stream Analytics.pptx
+++ b/Workshop/Content/5. Stream Analytics/Azure Stream Analytics.pptx
@@ -212,7 +212,7 @@
           <a:p>
             <a:fld id="{49B60EF2-7028-489F-85D8-FE86CD7CF2A0}" type="datetimeFigureOut">
               <a:rPr lang="en-US" smtClean="0"/>
-              <a:t>5/23/2016</a:t>
+              <a:t>6/22/2016</a:t>
             </a:fld>
             <a:endParaRPr lang="en-US"/>
           </a:p>
@@ -563,6 +563,431 @@
 </p:notes>
 </file>
 
+<file path=ppt/notesSlides/notesSlide10.xml><?xml version="1.0" encoding="utf-8"?>
+<p:notes xmlns:a="http://schemas.openxmlformats.org/drawingml/2006/main" xmlns:r="http://schemas.openxmlformats.org/officeDocument/2006/relationships" xmlns:p="http://schemas.openxmlformats.org/presentationml/2006/main">
+  <p:cSld>
+    <p:spTree>
+      <p:nvGrpSpPr>
+        <p:cNvPr id="1" name=""/>
+        <p:cNvGrpSpPr/>
+        <p:nvPr/>
+      </p:nvGrpSpPr>
+      <p:grpSpPr>
+        <a:xfrm>
+          <a:off x="0" y="0"/>
+          <a:ext cx="0" cy="0"/>
+          <a:chOff x="0" y="0"/>
+          <a:chExt cx="0" cy="0"/>
+        </a:xfrm>
+      </p:grpSpPr>
+      <p:sp>
+        <p:nvSpPr>
+          <p:cNvPr id="2" name="Slide Image Placeholder 1"/>
+          <p:cNvSpPr>
+            <a:spLocks noGrp="1" noRot="1" noChangeAspect="1"/>
+          </p:cNvSpPr>
+          <p:nvPr>
+            <p:ph type="sldImg"/>
+          </p:nvPr>
+        </p:nvSpPr>
+        <p:spPr/>
+      </p:sp>
+      <p:sp>
+        <p:nvSpPr>
+          <p:cNvPr id="3" name="Notes Placeholder 2"/>
+          <p:cNvSpPr>
+            <a:spLocks noGrp="1"/>
+          </p:cNvSpPr>
+          <p:nvPr>
+            <p:ph type="body" idx="1"/>
+          </p:nvPr>
+        </p:nvSpPr>
+        <p:spPr/>
+        <p:txBody>
+          <a:bodyPr/>
+          <a:lstStyle/>
+          <a:p>
+            <a:pPr marL="0" marR="0" indent="0" algn="l" defTabSz="914400" rtl="0" eaLnBrk="1" fontAlgn="auto" latinLnBrk="0" hangingPunct="1">
+              <a:lnSpc>
+                <a:spcPct val="100000"/>
+              </a:lnSpc>
+              <a:spcBef>
+                <a:spcPts val="0"/>
+              </a:spcBef>
+              <a:spcAft>
+                <a:spcPts val="0"/>
+              </a:spcAft>
+              <a:buClrTx/>
+              <a:buSzTx/>
+              <a:buFontTx/>
+              <a:buNone/>
+              <a:tabLst/>
+              <a:defRPr/>
+            </a:pPr>
+            <a:r>
+              <a:rPr lang="en-US" dirty="0" smtClean="0"/>
+              <a:t>This query answers the question "How many cars with</a:t>
+            </a:r>
+            <a:r>
+              <a:rPr lang="en-US" baseline="0" dirty="0" smtClean="0"/>
+              <a:t> NY license plates enter my tool booths every 5 minutes?" and generates an output every 5 minutes.</a:t>
+            </a:r>
+            <a:endParaRPr lang="en-US" dirty="0" smtClean="0"/>
+          </a:p>
+        </p:txBody>
+      </p:sp>
+      <p:sp>
+        <p:nvSpPr>
+          <p:cNvPr id="4" name="Slide Number Placeholder 3"/>
+          <p:cNvSpPr>
+            <a:spLocks noGrp="1"/>
+          </p:cNvSpPr>
+          <p:nvPr>
+            <p:ph type="sldNum" sz="quarter" idx="10"/>
+          </p:nvPr>
+        </p:nvSpPr>
+        <p:spPr/>
+        <p:txBody>
+          <a:bodyPr/>
+          <a:lstStyle/>
+          <a:p>
+            <a:fld id="{01283FAC-A721-45A3-BBDE-EAF2B09B7CD9}" type="slidenum">
+              <a:rPr lang="en-US" smtClean="0"/>
+              <a:t>10</a:t>
+            </a:fld>
+            <a:endParaRPr lang="en-US"/>
+          </a:p>
+        </p:txBody>
+      </p:sp>
+    </p:spTree>
+    <p:extLst>
+      <p:ext uri="{BB962C8B-B14F-4D97-AF65-F5344CB8AC3E}">
+        <p14:creationId xmlns:p14="http://schemas.microsoft.com/office/powerpoint/2010/main" val="2668363476"/>
+      </p:ext>
+    </p:extLst>
+  </p:cSld>
+  <p:clrMapOvr>
+    <a:masterClrMapping/>
+  </p:clrMapOvr>
+</p:notes>
+</file>
+
+<file path=ppt/notesSlides/notesSlide11.xml><?xml version="1.0" encoding="utf-8"?>
+<p:notes xmlns:a="http://schemas.openxmlformats.org/drawingml/2006/main" xmlns:r="http://schemas.openxmlformats.org/officeDocument/2006/relationships" xmlns:p="http://schemas.openxmlformats.org/presentationml/2006/main">
+  <p:cSld>
+    <p:spTree>
+      <p:nvGrpSpPr>
+        <p:cNvPr id="1" name=""/>
+        <p:cNvGrpSpPr/>
+        <p:nvPr/>
+      </p:nvGrpSpPr>
+      <p:grpSpPr>
+        <a:xfrm>
+          <a:off x="0" y="0"/>
+          <a:ext cx="0" cy="0"/>
+          <a:chOff x="0" y="0"/>
+          <a:chExt cx="0" cy="0"/>
+        </a:xfrm>
+      </p:grpSpPr>
+      <p:sp>
+        <p:nvSpPr>
+          <p:cNvPr id="2" name="Slide Image Placeholder 1"/>
+          <p:cNvSpPr>
+            <a:spLocks noGrp="1" noRot="1" noChangeAspect="1"/>
+          </p:cNvSpPr>
+          <p:nvPr>
+            <p:ph type="sldImg"/>
+          </p:nvPr>
+        </p:nvSpPr>
+        <p:spPr/>
+      </p:sp>
+      <p:sp>
+        <p:nvSpPr>
+          <p:cNvPr id="3" name="Notes Placeholder 2"/>
+          <p:cNvSpPr>
+            <a:spLocks noGrp="1"/>
+          </p:cNvSpPr>
+          <p:nvPr>
+            <p:ph type="body" idx="1"/>
+          </p:nvPr>
+        </p:nvSpPr>
+        <p:spPr/>
+        <p:txBody>
+          <a:bodyPr/>
+          <a:lstStyle/>
+          <a:p>
+            <a:pPr marL="0" marR="0" indent="0" algn="l" defTabSz="914400" rtl="0" eaLnBrk="1" fontAlgn="auto" latinLnBrk="0" hangingPunct="1">
+              <a:lnSpc>
+                <a:spcPct val="100000"/>
+              </a:lnSpc>
+              <a:spcBef>
+                <a:spcPts val="0"/>
+              </a:spcBef>
+              <a:spcAft>
+                <a:spcPts val="0"/>
+              </a:spcAft>
+              <a:buClrTx/>
+              <a:buSzTx/>
+              <a:buFontTx/>
+              <a:buNone/>
+              <a:tabLst/>
+              <a:defRPr/>
+            </a:pPr>
+            <a:r>
+              <a:rPr lang="en-US" dirty="0" smtClean="0"/>
+              <a:t>This query answers the question "What is the average wait time at all toll booths for the last 5 minutes</a:t>
+            </a:r>
+            <a:r>
+              <a:rPr lang="en-US" baseline="0" dirty="0" smtClean="0"/>
+              <a:t>?" and generates an output every 1 minute.</a:t>
+            </a:r>
+            <a:endParaRPr lang="en-US" dirty="0" smtClean="0"/>
+          </a:p>
+          <a:p>
+            <a:endParaRPr lang="en-US" dirty="0"/>
+          </a:p>
+        </p:txBody>
+      </p:sp>
+      <p:sp>
+        <p:nvSpPr>
+          <p:cNvPr id="4" name="Slide Number Placeholder 3"/>
+          <p:cNvSpPr>
+            <a:spLocks noGrp="1"/>
+          </p:cNvSpPr>
+          <p:nvPr>
+            <p:ph type="sldNum" sz="quarter" idx="10"/>
+          </p:nvPr>
+        </p:nvSpPr>
+        <p:spPr/>
+        <p:txBody>
+          <a:bodyPr/>
+          <a:lstStyle/>
+          <a:p>
+            <a:fld id="{01283FAC-A721-45A3-BBDE-EAF2B09B7CD9}" type="slidenum">
+              <a:rPr lang="en-US" smtClean="0"/>
+              <a:t>11</a:t>
+            </a:fld>
+            <a:endParaRPr lang="en-US"/>
+          </a:p>
+        </p:txBody>
+      </p:sp>
+    </p:spTree>
+    <p:extLst>
+      <p:ext uri="{BB962C8B-B14F-4D97-AF65-F5344CB8AC3E}">
+        <p14:creationId xmlns:p14="http://schemas.microsoft.com/office/powerpoint/2010/main" val="893910321"/>
+      </p:ext>
+    </p:extLst>
+  </p:cSld>
+  <p:clrMapOvr>
+    <a:masterClrMapping/>
+  </p:clrMapOvr>
+</p:notes>
+</file>
+
+<file path=ppt/notesSlides/notesSlide12.xml><?xml version="1.0" encoding="utf-8"?>
+<p:notes xmlns:a="http://schemas.openxmlformats.org/drawingml/2006/main" xmlns:r="http://schemas.openxmlformats.org/officeDocument/2006/relationships" xmlns:p="http://schemas.openxmlformats.org/presentationml/2006/main">
+  <p:cSld>
+    <p:spTree>
+      <p:nvGrpSpPr>
+        <p:cNvPr id="1" name=""/>
+        <p:cNvGrpSpPr/>
+        <p:nvPr/>
+      </p:nvGrpSpPr>
+      <p:grpSpPr>
+        <a:xfrm>
+          <a:off x="0" y="0"/>
+          <a:ext cx="0" cy="0"/>
+          <a:chOff x="0" y="0"/>
+          <a:chExt cx="0" cy="0"/>
+        </a:xfrm>
+      </p:grpSpPr>
+      <p:sp>
+        <p:nvSpPr>
+          <p:cNvPr id="2" name="Slide Image Placeholder 1"/>
+          <p:cNvSpPr>
+            <a:spLocks noGrp="1" noRot="1" noChangeAspect="1"/>
+          </p:cNvSpPr>
+          <p:nvPr>
+            <p:ph type="sldImg"/>
+          </p:nvPr>
+        </p:nvSpPr>
+        <p:spPr/>
+      </p:sp>
+      <p:sp>
+        <p:nvSpPr>
+          <p:cNvPr id="3" name="Notes Placeholder 2"/>
+          <p:cNvSpPr>
+            <a:spLocks noGrp="1"/>
+          </p:cNvSpPr>
+          <p:nvPr>
+            <p:ph type="body" idx="1"/>
+          </p:nvPr>
+        </p:nvSpPr>
+        <p:spPr/>
+        <p:txBody>
+          <a:bodyPr/>
+          <a:lstStyle/>
+          <a:p>
+            <a:pPr marL="0" marR="0" indent="0" algn="l" defTabSz="914400" rtl="0" eaLnBrk="1" fontAlgn="auto" latinLnBrk="0" hangingPunct="1">
+              <a:lnSpc>
+                <a:spcPct val="100000"/>
+              </a:lnSpc>
+              <a:spcBef>
+                <a:spcPts val="0"/>
+              </a:spcBef>
+              <a:spcAft>
+                <a:spcPts val="0"/>
+              </a:spcAft>
+              <a:buClrTx/>
+              <a:buSzTx/>
+              <a:buFontTx/>
+              <a:buNone/>
+              <a:tabLst/>
+              <a:defRPr/>
+            </a:pPr>
+            <a:r>
+              <a:rPr lang="en-US" dirty="0" smtClean="0"/>
+              <a:t>This query answers the question "Which toll booths have served at least one car with CT plates </a:t>
+            </a:r>
+            <a:r>
+              <a:rPr lang="en-US" baseline="0" dirty="0" smtClean="0"/>
+              <a:t>in any 5-minute period?"</a:t>
+            </a:r>
+            <a:endParaRPr lang="en-US" dirty="0" smtClean="0"/>
+          </a:p>
+          <a:p>
+            <a:endParaRPr lang="en-US" dirty="0"/>
+          </a:p>
+        </p:txBody>
+      </p:sp>
+      <p:sp>
+        <p:nvSpPr>
+          <p:cNvPr id="4" name="Slide Number Placeholder 3"/>
+          <p:cNvSpPr>
+            <a:spLocks noGrp="1"/>
+          </p:cNvSpPr>
+          <p:nvPr>
+            <p:ph type="sldNum" sz="quarter" idx="10"/>
+          </p:nvPr>
+        </p:nvSpPr>
+        <p:spPr/>
+        <p:txBody>
+          <a:bodyPr/>
+          <a:lstStyle/>
+          <a:p>
+            <a:fld id="{01283FAC-A721-45A3-BBDE-EAF2B09B7CD9}" type="slidenum">
+              <a:rPr lang="en-US" smtClean="0"/>
+              <a:t>12</a:t>
+            </a:fld>
+            <a:endParaRPr lang="en-US"/>
+          </a:p>
+        </p:txBody>
+      </p:sp>
+    </p:spTree>
+    <p:extLst>
+      <p:ext uri="{BB962C8B-B14F-4D97-AF65-F5344CB8AC3E}">
+        <p14:creationId xmlns:p14="http://schemas.microsoft.com/office/powerpoint/2010/main" val="463019462"/>
+      </p:ext>
+    </p:extLst>
+  </p:cSld>
+  <p:clrMapOvr>
+    <a:masterClrMapping/>
+  </p:clrMapOvr>
+</p:notes>
+</file>
+
+<file path=ppt/notesSlides/notesSlide13.xml><?xml version="1.0" encoding="utf-8"?>
+<p:notes xmlns:a="http://schemas.openxmlformats.org/drawingml/2006/main" xmlns:r="http://schemas.openxmlformats.org/officeDocument/2006/relationships" xmlns:p="http://schemas.openxmlformats.org/presentationml/2006/main">
+  <p:cSld>
+    <p:spTree>
+      <p:nvGrpSpPr>
+        <p:cNvPr id="1" name=""/>
+        <p:cNvGrpSpPr/>
+        <p:nvPr/>
+      </p:nvGrpSpPr>
+      <p:grpSpPr>
+        <a:xfrm>
+          <a:off x="0" y="0"/>
+          <a:ext cx="0" cy="0"/>
+          <a:chOff x="0" y="0"/>
+          <a:chExt cx="0" cy="0"/>
+        </a:xfrm>
+      </p:grpSpPr>
+      <p:sp>
+        <p:nvSpPr>
+          <p:cNvPr id="2" name="Slide Image Placeholder 1"/>
+          <p:cNvSpPr>
+            <a:spLocks noGrp="1" noRot="1" noChangeAspect="1"/>
+          </p:cNvSpPr>
+          <p:nvPr>
+            <p:ph type="sldImg"/>
+          </p:nvPr>
+        </p:nvSpPr>
+        <p:spPr/>
+      </p:sp>
+      <p:sp>
+        <p:nvSpPr>
+          <p:cNvPr id="3" name="Notes Placeholder 2"/>
+          <p:cNvSpPr>
+            <a:spLocks noGrp="1"/>
+          </p:cNvSpPr>
+          <p:nvPr>
+            <p:ph type="body" idx="1"/>
+          </p:nvPr>
+        </p:nvSpPr>
+        <p:spPr/>
+        <p:txBody>
+          <a:bodyPr/>
+          <a:lstStyle/>
+          <a:p>
+            <a:r>
+              <a:rPr lang="en-US" dirty="0" smtClean="0"/>
+              <a:t>You can connect</a:t>
+            </a:r>
+            <a:r>
+              <a:rPr lang="en-US" baseline="0" dirty="0" smtClean="0"/>
+              <a:t> Microsoft Power BI to a Stream Analytics output and generate graphical dashboards without writing any code. Or, if you're a developer, you can use an event hub as output from a Stream Analytics job and build highly customized dashboards by writing code that subscribes to events fired from the event hub. That is exactly what you'll do in the next lab. The screen shot in this slide shows a preview of what you're going to build.</a:t>
+            </a:r>
+            <a:endParaRPr lang="en-US" dirty="0"/>
+          </a:p>
+        </p:txBody>
+      </p:sp>
+      <p:sp>
+        <p:nvSpPr>
+          <p:cNvPr id="4" name="Slide Number Placeholder 3"/>
+          <p:cNvSpPr>
+            <a:spLocks noGrp="1"/>
+          </p:cNvSpPr>
+          <p:nvPr>
+            <p:ph type="sldNum" sz="quarter" idx="10"/>
+          </p:nvPr>
+        </p:nvSpPr>
+        <p:spPr/>
+        <p:txBody>
+          <a:bodyPr/>
+          <a:lstStyle/>
+          <a:p>
+            <a:fld id="{01283FAC-A721-45A3-BBDE-EAF2B09B7CD9}" type="slidenum">
+              <a:rPr lang="en-US" smtClean="0"/>
+              <a:t>13</a:t>
+            </a:fld>
+            <a:endParaRPr lang="en-US"/>
+          </a:p>
+        </p:txBody>
+      </p:sp>
+    </p:spTree>
+    <p:extLst>
+      <p:ext uri="{BB962C8B-B14F-4D97-AF65-F5344CB8AC3E}">
+        <p14:creationId xmlns:p14="http://schemas.microsoft.com/office/powerpoint/2010/main" val="822528167"/>
+      </p:ext>
+    </p:extLst>
+  </p:cSld>
+  <p:clrMapOvr>
+    <a:masterClrMapping/>
+  </p:clrMapOvr>
+</p:notes>
+</file>
+
 <file path=ppt/notesSlides/notesSlide2.xml><?xml version="1.0" encoding="utf-8"?>
 <p:notes xmlns:a="http://schemas.openxmlformats.org/drawingml/2006/main" xmlns:r="http://schemas.openxmlformats.org/officeDocument/2006/relationships" xmlns:p="http://schemas.openxmlformats.org/presentationml/2006/main">
   <p:cSld>
@@ -607,6 +1032,30 @@
           <a:bodyPr/>
           <a:lstStyle/>
           <a:p>
+            <a:r>
+              <a:rPr lang="en-US" dirty="0" smtClean="0"/>
+              <a:t>Extracting information</a:t>
+            </a:r>
+            <a:r>
+              <a:rPr lang="en-US" baseline="0" dirty="0" smtClean="0"/>
+              <a:t> </a:t>
+            </a:r>
+            <a:r>
+              <a:rPr lang="en-US" dirty="0" smtClean="0"/>
+              <a:t>fro</a:t>
+            </a:r>
+            <a:r>
+              <a:rPr lang="en-US" baseline="0" dirty="0" smtClean="0"/>
+              <a:t>m a database using queries (for example, SQL queries) is a well-understood science and is familiar to most researchers. Extracting information from high-volume, high-velocity data streams is an altogether different proposition. Imagine thousands of wind turbines firing telemetry data that includes gear-box oil temperatures (along with other information) at a centralized event hub. How would you write a query that, in real time, identifies all wind turbines whose average oil temperature over the last three minutes exceeds a certain threshold? The demand to process fast-moving data streams in this way is growing every day thanks to the proliferation of mobile phones and </a:t>
+            </a:r>
+            <a:r>
+              <a:rPr lang="en-US" baseline="0" dirty="0" err="1" smtClean="0"/>
+              <a:t>IoT</a:t>
+            </a:r>
+            <a:r>
+              <a:rPr lang="en-US" baseline="0" dirty="0" smtClean="0"/>
+              <a:t> devices.</a:t>
+            </a:r>
             <a:endParaRPr lang="en-US" dirty="0"/>
           </a:p>
         </p:txBody>
@@ -799,6 +1248,22 @@
           <a:bodyPr/>
           <a:lstStyle/>
           <a:p>
+            <a:r>
+              <a:rPr lang="en-US" dirty="0" smtClean="0"/>
+              <a:t>Here's a typical scenario</a:t>
+            </a:r>
+            <a:r>
+              <a:rPr lang="en-US" baseline="0" dirty="0" smtClean="0"/>
+              <a:t> showing how Stream Analytics is used. On the left are the event producers, such as mobile phones an </a:t>
+            </a:r>
+            <a:r>
+              <a:rPr lang="en-US" baseline="0" dirty="0" err="1" smtClean="0"/>
+              <a:t>IoT</a:t>
+            </a:r>
+            <a:r>
+              <a:rPr lang="en-US" baseline="0" dirty="0" smtClean="0"/>
+              <a:t> sensors. They fire events to an Azure event hub (using a cloud gateway as an intermediary if the devices themselves aren't IP-capable), which aggregates the events and delivers them to a Stream Analytics job. Stream Analytics queries the data stream and sends the results to one or more outputs, which might include blob storage, a SQL Azure database, another event hub, or (not shown here) Microsoft Power BI.</a:t>
+            </a:r>
             <a:endParaRPr lang="en-US" dirty="0"/>
           </a:p>
         </p:txBody>
@@ -820,6 +1285,434 @@
           <a:p>
             <a:fld id="{01283FAC-A721-45A3-BBDE-EAF2B09B7CD9}" type="slidenum">
               <a:rPr lang="en-US" smtClean="0"/>
+              <a:t>4</a:t>
+            </a:fld>
+            <a:endParaRPr lang="en-US"/>
+          </a:p>
+        </p:txBody>
+      </p:sp>
+    </p:spTree>
+    <p:extLst>
+      <p:ext uri="{BB962C8B-B14F-4D97-AF65-F5344CB8AC3E}">
+        <p14:creationId xmlns:p14="http://schemas.microsoft.com/office/powerpoint/2010/main" val="1686959448"/>
+      </p:ext>
+    </p:extLst>
+  </p:cSld>
+  <p:clrMapOvr>
+    <a:masterClrMapping/>
+  </p:clrMapOvr>
+</p:notes>
+</file>
+
+<file path=ppt/notesSlides/notesSlide5.xml><?xml version="1.0" encoding="utf-8"?>
+<p:notes xmlns:a="http://schemas.openxmlformats.org/drawingml/2006/main" xmlns:r="http://schemas.openxmlformats.org/officeDocument/2006/relationships" xmlns:p="http://schemas.openxmlformats.org/presentationml/2006/main">
+  <p:cSld>
+    <p:spTree>
+      <p:nvGrpSpPr>
+        <p:cNvPr id="1" name=""/>
+        <p:cNvGrpSpPr/>
+        <p:nvPr/>
+      </p:nvGrpSpPr>
+      <p:grpSpPr>
+        <a:xfrm>
+          <a:off x="0" y="0"/>
+          <a:ext cx="0" cy="0"/>
+          <a:chOff x="0" y="0"/>
+          <a:chExt cx="0" cy="0"/>
+        </a:xfrm>
+      </p:grpSpPr>
+      <p:sp>
+        <p:nvSpPr>
+          <p:cNvPr id="2" name="Slide Image Placeholder 1"/>
+          <p:cNvSpPr>
+            <a:spLocks noGrp="1" noRot="1" noChangeAspect="1"/>
+          </p:cNvSpPr>
+          <p:nvPr>
+            <p:ph type="sldImg"/>
+          </p:nvPr>
+        </p:nvSpPr>
+        <p:spPr/>
+      </p:sp>
+      <p:sp>
+        <p:nvSpPr>
+          <p:cNvPr id="3" name="Notes Placeholder 2"/>
+          <p:cNvSpPr>
+            <a:spLocks noGrp="1"/>
+          </p:cNvSpPr>
+          <p:nvPr>
+            <p:ph type="body" idx="1"/>
+          </p:nvPr>
+        </p:nvSpPr>
+        <p:spPr/>
+        <p:txBody>
+          <a:bodyPr/>
+          <a:lstStyle/>
+          <a:p>
+            <a:r>
+              <a:rPr lang="en-US" dirty="0" smtClean="0"/>
+              <a:t>The genius of Azure Stream Analytics is that</a:t>
+            </a:r>
+            <a:r>
+              <a:rPr lang="en-US" baseline="0" dirty="0" smtClean="0"/>
+              <a:t> it allows you to "use what you know" by using SQL to query dynamic data streams. It's not straight SQL, but an enhanced version of T-SQL. The enhancements are necessary to deal with dynamic data. For example, the windowing enhancements enable you to ask questions such as "how many red cars enter the parking lot every 5 minutes?" TIMESTAMP BY lets you designate a field in the data stream as the one that holds the event time -- the time at which the event actually occurred (as opposed to the time the event reached an event hub, which is the default).</a:t>
+            </a:r>
+            <a:endParaRPr lang="en-US" dirty="0"/>
+          </a:p>
+        </p:txBody>
+      </p:sp>
+      <p:sp>
+        <p:nvSpPr>
+          <p:cNvPr id="4" name="Slide Number Placeholder 3"/>
+          <p:cNvSpPr>
+            <a:spLocks noGrp="1"/>
+          </p:cNvSpPr>
+          <p:nvPr>
+            <p:ph type="sldNum" sz="quarter" idx="10"/>
+          </p:nvPr>
+        </p:nvSpPr>
+        <p:spPr/>
+        <p:txBody>
+          <a:bodyPr/>
+          <a:lstStyle/>
+          <a:p>
+            <a:fld id="{01283FAC-A721-45A3-BBDE-EAF2B09B7CD9}" type="slidenum">
+              <a:rPr lang="en-US" smtClean="0"/>
+              <a:t>5</a:t>
+            </a:fld>
+            <a:endParaRPr lang="en-US"/>
+          </a:p>
+        </p:txBody>
+      </p:sp>
+    </p:spTree>
+    <p:extLst>
+      <p:ext uri="{BB962C8B-B14F-4D97-AF65-F5344CB8AC3E}">
+        <p14:creationId xmlns:p14="http://schemas.microsoft.com/office/powerpoint/2010/main" val="4078729442"/>
+      </p:ext>
+    </p:extLst>
+  </p:cSld>
+  <p:clrMapOvr>
+    <a:masterClrMapping/>
+  </p:clrMapOvr>
+</p:notes>
+</file>
+
+<file path=ppt/notesSlides/notesSlide6.xml><?xml version="1.0" encoding="utf-8"?>
+<p:notes xmlns:a="http://schemas.openxmlformats.org/drawingml/2006/main" xmlns:r="http://schemas.openxmlformats.org/officeDocument/2006/relationships" xmlns:p="http://schemas.openxmlformats.org/presentationml/2006/main">
+  <p:cSld>
+    <p:spTree>
+      <p:nvGrpSpPr>
+        <p:cNvPr id="1" name=""/>
+        <p:cNvGrpSpPr/>
+        <p:nvPr/>
+      </p:nvGrpSpPr>
+      <p:grpSpPr>
+        <a:xfrm>
+          <a:off x="0" y="0"/>
+          <a:ext cx="0" cy="0"/>
+          <a:chOff x="0" y="0"/>
+          <a:chExt cx="0" cy="0"/>
+        </a:xfrm>
+      </p:grpSpPr>
+      <p:sp>
+        <p:nvSpPr>
+          <p:cNvPr id="2" name="Slide Image Placeholder 1"/>
+          <p:cNvSpPr>
+            <a:spLocks noGrp="1" noRot="1" noChangeAspect="1"/>
+          </p:cNvSpPr>
+          <p:nvPr>
+            <p:ph type="sldImg"/>
+          </p:nvPr>
+        </p:nvSpPr>
+        <p:spPr/>
+      </p:sp>
+      <p:sp>
+        <p:nvSpPr>
+          <p:cNvPr id="3" name="Notes Placeholder 2"/>
+          <p:cNvSpPr>
+            <a:spLocks noGrp="1"/>
+          </p:cNvSpPr>
+          <p:nvPr>
+            <p:ph type="body" idx="1"/>
+          </p:nvPr>
+        </p:nvSpPr>
+        <p:spPr/>
+        <p:txBody>
+          <a:bodyPr/>
+          <a:lstStyle/>
+          <a:p>
+            <a:r>
+              <a:rPr lang="en-US" dirty="0" smtClean="0"/>
+              <a:t>This is a simple query that would work against a SQL database. It also works in</a:t>
+            </a:r>
+            <a:r>
+              <a:rPr lang="en-US" baseline="0" dirty="0" smtClean="0"/>
+              <a:t> </a:t>
+            </a:r>
+            <a:r>
+              <a:rPr lang="en-US" dirty="0" smtClean="0"/>
+              <a:t>Azure</a:t>
+            </a:r>
+            <a:r>
+              <a:rPr lang="en-US" baseline="0" dirty="0" smtClean="0"/>
+              <a:t> Stream Analytics. The context is a scenario in which you manage a collection of toll booths, and an event is fired each time a car enters or leaves a tool booth (two separate data streams in this scenario). Each event includes information such as the event time, the make and model of the car, and the car's license plate info (state and license-plate number).</a:t>
+            </a:r>
+            <a:endParaRPr lang="en-US" dirty="0"/>
+          </a:p>
+        </p:txBody>
+      </p:sp>
+      <p:sp>
+        <p:nvSpPr>
+          <p:cNvPr id="4" name="Slide Number Placeholder 3"/>
+          <p:cNvSpPr>
+            <a:spLocks noGrp="1"/>
+          </p:cNvSpPr>
+          <p:nvPr>
+            <p:ph type="sldNum" sz="quarter" idx="10"/>
+          </p:nvPr>
+        </p:nvSpPr>
+        <p:spPr/>
+        <p:txBody>
+          <a:bodyPr/>
+          <a:lstStyle/>
+          <a:p>
+            <a:fld id="{01283FAC-A721-45A3-BBDE-EAF2B09B7CD9}" type="slidenum">
+              <a:rPr lang="en-US" smtClean="0"/>
+              <a:t>6</a:t>
+            </a:fld>
+            <a:endParaRPr lang="en-US"/>
+          </a:p>
+        </p:txBody>
+      </p:sp>
+    </p:spTree>
+    <p:extLst>
+      <p:ext uri="{BB962C8B-B14F-4D97-AF65-F5344CB8AC3E}">
+        <p14:creationId xmlns:p14="http://schemas.microsoft.com/office/powerpoint/2010/main" val="2335240651"/>
+      </p:ext>
+    </p:extLst>
+  </p:cSld>
+  <p:clrMapOvr>
+    <a:masterClrMapping/>
+  </p:clrMapOvr>
+</p:notes>
+</file>
+
+<file path=ppt/notesSlides/notesSlide7.xml><?xml version="1.0" encoding="utf-8"?>
+<p:notes xmlns:a="http://schemas.openxmlformats.org/drawingml/2006/main" xmlns:r="http://schemas.openxmlformats.org/officeDocument/2006/relationships" xmlns:p="http://schemas.openxmlformats.org/presentationml/2006/main">
+  <p:cSld>
+    <p:spTree>
+      <p:nvGrpSpPr>
+        <p:cNvPr id="1" name=""/>
+        <p:cNvGrpSpPr/>
+        <p:nvPr/>
+      </p:nvGrpSpPr>
+      <p:grpSpPr>
+        <a:xfrm>
+          <a:off x="0" y="0"/>
+          <a:ext cx="0" cy="0"/>
+          <a:chOff x="0" y="0"/>
+          <a:chExt cx="0" cy="0"/>
+        </a:xfrm>
+      </p:grpSpPr>
+      <p:sp>
+        <p:nvSpPr>
+          <p:cNvPr id="2" name="Slide Image Placeholder 1"/>
+          <p:cNvSpPr>
+            <a:spLocks noGrp="1" noRot="1" noChangeAspect="1"/>
+          </p:cNvSpPr>
+          <p:nvPr>
+            <p:ph type="sldImg"/>
+          </p:nvPr>
+        </p:nvSpPr>
+        <p:spPr/>
+      </p:sp>
+      <p:sp>
+        <p:nvSpPr>
+          <p:cNvPr id="3" name="Notes Placeholder 2"/>
+          <p:cNvSpPr>
+            <a:spLocks noGrp="1"/>
+          </p:cNvSpPr>
+          <p:nvPr>
+            <p:ph type="body" idx="1"/>
+          </p:nvPr>
+        </p:nvSpPr>
+        <p:spPr/>
+        <p:txBody>
+          <a:bodyPr/>
+          <a:lstStyle/>
+          <a:p>
+            <a:r>
+              <a:rPr lang="en-US" dirty="0" smtClean="0"/>
+              <a:t>TIMESTAMP BY is an important extension to the Stream Analytics Query Language </a:t>
+            </a:r>
+            <a:r>
+              <a:rPr lang="en-US" baseline="0" dirty="0" smtClean="0"/>
+              <a:t>because it lets you designate one field in the data stream as the one that specifies the event time -- the time at which the event actually occurred. Without this, queries that involve event times use the </a:t>
+            </a:r>
+            <a:r>
+              <a:rPr lang="en-US" i="1" baseline="0" dirty="0" smtClean="0"/>
+              <a:t>time at which the event arrived at the event hub</a:t>
+            </a:r>
+            <a:r>
+              <a:rPr lang="en-US" baseline="0" dirty="0" smtClean="0"/>
+              <a:t>, not the time at which the event occurred. Virtually all </a:t>
+            </a:r>
+            <a:r>
+              <a:rPr lang="en-US" baseline="0" dirty="0" err="1" smtClean="0"/>
+              <a:t>IoT</a:t>
+            </a:r>
+            <a:r>
+              <a:rPr lang="en-US" baseline="0" dirty="0" smtClean="0"/>
+              <a:t> data streams include an event-time field.</a:t>
+            </a:r>
+            <a:endParaRPr lang="en-US" dirty="0"/>
+          </a:p>
+        </p:txBody>
+      </p:sp>
+      <p:sp>
+        <p:nvSpPr>
+          <p:cNvPr id="4" name="Slide Number Placeholder 3"/>
+          <p:cNvSpPr>
+            <a:spLocks noGrp="1"/>
+          </p:cNvSpPr>
+          <p:nvPr>
+            <p:ph type="sldNum" sz="quarter" idx="10"/>
+          </p:nvPr>
+        </p:nvSpPr>
+        <p:spPr/>
+        <p:txBody>
+          <a:bodyPr/>
+          <a:lstStyle/>
+          <a:p>
+            <a:fld id="{01283FAC-A721-45A3-BBDE-EAF2B09B7CD9}" type="slidenum">
+              <a:rPr lang="en-US" smtClean="0"/>
+              <a:t>7</a:t>
+            </a:fld>
+            <a:endParaRPr lang="en-US"/>
+          </a:p>
+        </p:txBody>
+      </p:sp>
+    </p:spTree>
+    <p:extLst>
+      <p:ext uri="{BB962C8B-B14F-4D97-AF65-F5344CB8AC3E}">
+        <p14:creationId xmlns:p14="http://schemas.microsoft.com/office/powerpoint/2010/main" val="1898835277"/>
+      </p:ext>
+    </p:extLst>
+  </p:cSld>
+  <p:clrMapOvr>
+    <a:masterClrMapping/>
+  </p:clrMapOvr>
+</p:notes>
+</file>
+
+<file path=ppt/notesSlides/notesSlide8.xml><?xml version="1.0" encoding="utf-8"?>
+<p:notes xmlns:a="http://schemas.openxmlformats.org/drawingml/2006/main" xmlns:r="http://schemas.openxmlformats.org/officeDocument/2006/relationships" xmlns:p="http://schemas.openxmlformats.org/presentationml/2006/main">
+  <p:cSld>
+    <p:spTree>
+      <p:nvGrpSpPr>
+        <p:cNvPr id="1" name=""/>
+        <p:cNvGrpSpPr/>
+        <p:nvPr/>
+      </p:nvGrpSpPr>
+      <p:grpSpPr>
+        <a:xfrm>
+          <a:off x="0" y="0"/>
+          <a:ext cx="0" cy="0"/>
+          <a:chOff x="0" y="0"/>
+          <a:chExt cx="0" cy="0"/>
+        </a:xfrm>
+      </p:grpSpPr>
+      <p:sp>
+        <p:nvSpPr>
+          <p:cNvPr id="2" name="Slide Image Placeholder 1"/>
+          <p:cNvSpPr>
+            <a:spLocks noGrp="1" noRot="1" noChangeAspect="1"/>
+          </p:cNvSpPr>
+          <p:nvPr>
+            <p:ph type="sldImg"/>
+          </p:nvPr>
+        </p:nvSpPr>
+        <p:spPr/>
+      </p:sp>
+      <p:sp>
+        <p:nvSpPr>
+          <p:cNvPr id="3" name="Notes Placeholder 2"/>
+          <p:cNvSpPr>
+            <a:spLocks noGrp="1"/>
+          </p:cNvSpPr>
+          <p:nvPr>
+            <p:ph type="body" idx="1"/>
+          </p:nvPr>
+        </p:nvSpPr>
+        <p:spPr/>
+        <p:txBody>
+          <a:bodyPr/>
+          <a:lstStyle/>
+          <a:p>
+            <a:pPr marL="0" marR="0" indent="0" algn="l" defTabSz="914400" rtl="0" eaLnBrk="1" fontAlgn="auto" latinLnBrk="0" hangingPunct="1">
+              <a:lnSpc>
+                <a:spcPct val="100000"/>
+              </a:lnSpc>
+              <a:spcBef>
+                <a:spcPts val="0"/>
+              </a:spcBef>
+              <a:spcAft>
+                <a:spcPts val="0"/>
+              </a:spcAft>
+              <a:buClrTx/>
+              <a:buSzTx/>
+              <a:buFontTx/>
+              <a:buNone/>
+              <a:tabLst/>
+              <a:defRPr/>
+            </a:pPr>
+            <a:r>
+              <a:rPr lang="en-US" dirty="0" smtClean="0"/>
+              <a:t>This query determines how long it took to service each car that entered a toll</a:t>
+            </a:r>
+            <a:r>
+              <a:rPr lang="en-US" baseline="0" dirty="0" smtClean="0"/>
+              <a:t> booth (i.e., the difference between the time the car entered and exited the toll both). It demonstrates the use of the all-important TIMESTAMP BY extension, which allows you to designate a field in the input as the event time. Without TIMESTAMP BY, the event time is the time at which the event arrived at the input source. And it demonstrates that just as you can use JOIN to join two tables in a SQL database, you can use JOIN in Stream Analytics to join two inputs (data streams). In this example, the two data streams are </a:t>
+            </a:r>
+            <a:r>
+              <a:rPr lang="en-US" baseline="0" dirty="0" err="1" smtClean="0"/>
+              <a:t>EntryData</a:t>
+            </a:r>
+            <a:r>
+              <a:rPr lang="en-US" baseline="0" dirty="0" smtClean="0"/>
+              <a:t> and </a:t>
+            </a:r>
+            <a:r>
+              <a:rPr lang="en-US" baseline="0" dirty="0" err="1" smtClean="0"/>
+              <a:t>ExitData</a:t>
+            </a:r>
+            <a:r>
+              <a:rPr lang="en-US" baseline="0" dirty="0" smtClean="0"/>
+              <a:t>.</a:t>
+            </a:r>
+            <a:endParaRPr lang="en-US" dirty="0" smtClean="0"/>
+          </a:p>
+          <a:p>
+            <a:endParaRPr lang="en-US" dirty="0"/>
+          </a:p>
+        </p:txBody>
+      </p:sp>
+      <p:sp>
+        <p:nvSpPr>
+          <p:cNvPr id="4" name="Slide Number Placeholder 3"/>
+          <p:cNvSpPr>
+            <a:spLocks noGrp="1"/>
+          </p:cNvSpPr>
+          <p:nvPr>
+            <p:ph type="sldNum" sz="quarter" idx="10"/>
+          </p:nvPr>
+        </p:nvSpPr>
+        <p:spPr/>
+        <p:txBody>
+          <a:bodyPr/>
+          <a:lstStyle/>
+          <a:p>
+            <a:fld id="{01283FAC-A721-45A3-BBDE-EAF2B09B7CD9}" type="slidenum">
+              <a:rPr lang="en-US" smtClean="0"/>
               <a:t>8</a:t>
             </a:fld>
             <a:endParaRPr lang="en-US"/>
@@ -830,6 +1723,239 @@
     <p:extLst>
       <p:ext uri="{BB962C8B-B14F-4D97-AF65-F5344CB8AC3E}">
         <p14:creationId xmlns:p14="http://schemas.microsoft.com/office/powerpoint/2010/main" val="1259331008"/>
+      </p:ext>
+    </p:extLst>
+  </p:cSld>
+  <p:clrMapOvr>
+    <a:masterClrMapping/>
+  </p:clrMapOvr>
+</p:notes>
+</file>
+
+<file path=ppt/notesSlides/notesSlide9.xml><?xml version="1.0" encoding="utf-8"?>
+<p:notes xmlns:a="http://schemas.openxmlformats.org/drawingml/2006/main" xmlns:r="http://schemas.openxmlformats.org/officeDocument/2006/relationships" xmlns:p="http://schemas.openxmlformats.org/presentationml/2006/main">
+  <p:cSld>
+    <p:spTree>
+      <p:nvGrpSpPr>
+        <p:cNvPr id="1" name=""/>
+        <p:cNvGrpSpPr/>
+        <p:nvPr/>
+      </p:nvGrpSpPr>
+      <p:grpSpPr>
+        <a:xfrm>
+          <a:off x="0" y="0"/>
+          <a:ext cx="0" cy="0"/>
+          <a:chOff x="0" y="0"/>
+          <a:chExt cx="0" cy="0"/>
+        </a:xfrm>
+      </p:grpSpPr>
+      <p:sp>
+        <p:nvSpPr>
+          <p:cNvPr id="2" name="Slide Image Placeholder 1"/>
+          <p:cNvSpPr>
+            <a:spLocks noGrp="1" noRot="1" noChangeAspect="1"/>
+          </p:cNvSpPr>
+          <p:nvPr>
+            <p:ph type="sldImg"/>
+          </p:nvPr>
+        </p:nvSpPr>
+        <p:spPr/>
+      </p:sp>
+      <p:sp>
+        <p:nvSpPr>
+          <p:cNvPr id="3" name="Notes Placeholder 2"/>
+          <p:cNvSpPr>
+            <a:spLocks noGrp="1"/>
+          </p:cNvSpPr>
+          <p:nvPr>
+            <p:ph type="body" idx="1"/>
+          </p:nvPr>
+        </p:nvSpPr>
+        <p:spPr/>
+        <p:txBody>
+          <a:bodyPr/>
+          <a:lstStyle/>
+          <a:p>
+            <a:pPr marL="0" marR="0" indent="0" algn="l" defTabSz="914400" rtl="0" eaLnBrk="1" fontAlgn="auto" latinLnBrk="0" hangingPunct="1">
+              <a:lnSpc>
+                <a:spcPct val="100000"/>
+              </a:lnSpc>
+              <a:spcBef>
+                <a:spcPts val="0"/>
+              </a:spcBef>
+              <a:spcAft>
+                <a:spcPts val="0"/>
+              </a:spcAft>
+              <a:buClrTx/>
+              <a:buSzTx/>
+              <a:buFontTx/>
+              <a:buNone/>
+              <a:tabLst/>
+              <a:defRPr/>
+            </a:pPr>
+            <a:r>
+              <a:rPr lang="en-US" sz="1200" b="0" i="0" kern="1200" dirty="0" smtClean="0">
+                <a:solidFill>
+                  <a:schemeClr val="tx1"/>
+                </a:solidFill>
+                <a:effectLst/>
+                <a:latin typeface="+mn-lt"/>
+                <a:ea typeface="+mn-ea"/>
+                <a:cs typeface="+mn-cs"/>
+              </a:rPr>
+              <a:t>One of the key features of the Stream Analytics Query Language is its ability to group results using windows of time whose length you specify. Syntactically, you exercise windowing by using</a:t>
+            </a:r>
+            <a:r>
+              <a:rPr lang="en-US" sz="1200" b="0" i="0" kern="1200" baseline="0" dirty="0" smtClean="0">
+                <a:solidFill>
+                  <a:schemeClr val="tx1"/>
+                </a:solidFill>
+                <a:effectLst/>
+                <a:latin typeface="+mn-lt"/>
+                <a:ea typeface="+mn-ea"/>
+                <a:cs typeface="+mn-cs"/>
+              </a:rPr>
+              <a:t> SQL's GROUP BY clause with </a:t>
+            </a:r>
+            <a:r>
+              <a:rPr lang="en-US" sz="1200" b="0" i="0" kern="1200" baseline="0" dirty="0" err="1" smtClean="0">
+                <a:solidFill>
+                  <a:schemeClr val="tx1"/>
+                </a:solidFill>
+                <a:effectLst/>
+                <a:latin typeface="+mn-lt"/>
+                <a:ea typeface="+mn-ea"/>
+                <a:cs typeface="+mn-cs"/>
+              </a:rPr>
+              <a:t>TumblingWindow</a:t>
+            </a:r>
+            <a:r>
+              <a:rPr lang="en-US" sz="1200" b="0" i="0" kern="1200" baseline="0" dirty="0" smtClean="0">
+                <a:solidFill>
+                  <a:schemeClr val="tx1"/>
+                </a:solidFill>
+                <a:effectLst/>
+                <a:latin typeface="+mn-lt"/>
+                <a:ea typeface="+mn-ea"/>
+                <a:cs typeface="+mn-cs"/>
+              </a:rPr>
+              <a:t>, </a:t>
+            </a:r>
+            <a:r>
+              <a:rPr lang="en-US" sz="1200" b="0" i="0" kern="1200" baseline="0" dirty="0" err="1" smtClean="0">
+                <a:solidFill>
+                  <a:schemeClr val="tx1"/>
+                </a:solidFill>
+                <a:effectLst/>
+                <a:latin typeface="+mn-lt"/>
+                <a:ea typeface="+mn-ea"/>
+                <a:cs typeface="+mn-cs"/>
+              </a:rPr>
+              <a:t>HoppingWindow</a:t>
+            </a:r>
+            <a:r>
+              <a:rPr lang="en-US" sz="1200" b="0" i="0" kern="1200" baseline="0" dirty="0" smtClean="0">
+                <a:solidFill>
+                  <a:schemeClr val="tx1"/>
+                </a:solidFill>
+                <a:effectLst/>
+                <a:latin typeface="+mn-lt"/>
+                <a:ea typeface="+mn-ea"/>
+                <a:cs typeface="+mn-cs"/>
+              </a:rPr>
+              <a:t>, or </a:t>
+            </a:r>
+            <a:r>
+              <a:rPr lang="en-US" sz="1200" b="0" i="0" kern="1200" baseline="0" dirty="0" err="1" smtClean="0">
+                <a:solidFill>
+                  <a:schemeClr val="tx1"/>
+                </a:solidFill>
+                <a:effectLst/>
+                <a:latin typeface="+mn-lt"/>
+                <a:ea typeface="+mn-ea"/>
+                <a:cs typeface="+mn-cs"/>
+              </a:rPr>
+              <a:t>SlidingWindow</a:t>
+            </a:r>
+            <a:r>
+              <a:rPr lang="en-US" sz="1200" b="0" i="0" kern="1200" baseline="0" dirty="0" smtClean="0">
+                <a:solidFill>
+                  <a:schemeClr val="tx1"/>
+                </a:solidFill>
+                <a:effectLst/>
+                <a:latin typeface="+mn-lt"/>
+                <a:ea typeface="+mn-ea"/>
+                <a:cs typeface="+mn-cs"/>
+              </a:rPr>
+              <a:t>. </a:t>
+            </a:r>
+            <a:r>
+              <a:rPr lang="en-US" dirty="0" err="1" smtClean="0"/>
+              <a:t>TumblingWindow</a:t>
+            </a:r>
+            <a:r>
+              <a:rPr lang="en-US" dirty="0" smtClean="0"/>
+              <a:t> allows you to ask questions such as "How many red cars go through my toll</a:t>
+            </a:r>
+            <a:r>
+              <a:rPr lang="en-US" baseline="0" dirty="0" smtClean="0"/>
+              <a:t> booths every 5 minutes?" </a:t>
+            </a:r>
+            <a:r>
+              <a:rPr lang="en-US" baseline="0" dirty="0" err="1" smtClean="0"/>
+              <a:t>HoppingWindow</a:t>
+            </a:r>
+            <a:r>
+              <a:rPr lang="en-US" baseline="0" dirty="0" smtClean="0"/>
+              <a:t> lets you ask the same question but generate output at intervals that are independent of the window size -- for example, "Tell me once a minute h</a:t>
+            </a:r>
+            <a:r>
+              <a:rPr lang="en-US" dirty="0" smtClean="0"/>
+              <a:t>ow many red cars go through my toll</a:t>
+            </a:r>
+            <a:r>
+              <a:rPr lang="en-US" baseline="0" dirty="0" smtClean="0"/>
+              <a:t> booths every 5 minutes." </a:t>
+            </a:r>
+            <a:r>
+              <a:rPr lang="en-US" baseline="0" dirty="0" err="1" smtClean="0"/>
+              <a:t>SlidingWindow</a:t>
+            </a:r>
+            <a:r>
+              <a:rPr lang="en-US" baseline="0" dirty="0" smtClean="0"/>
+              <a:t> lets you ask "During which 5-minute time periods do 10 or more red cars go through my toll booths?"</a:t>
+            </a:r>
+            <a:endParaRPr lang="en-US" dirty="0" smtClean="0"/>
+          </a:p>
+        </p:txBody>
+      </p:sp>
+      <p:sp>
+        <p:nvSpPr>
+          <p:cNvPr id="4" name="Slide Number Placeholder 3"/>
+          <p:cNvSpPr>
+            <a:spLocks noGrp="1"/>
+          </p:cNvSpPr>
+          <p:nvPr>
+            <p:ph type="sldNum" sz="quarter" idx="10"/>
+          </p:nvPr>
+        </p:nvSpPr>
+        <p:spPr/>
+        <p:txBody>
+          <a:bodyPr/>
+          <a:lstStyle/>
+          <a:p>
+            <a:fld id="{01283FAC-A721-45A3-BBDE-EAF2B09B7CD9}" type="slidenum">
+              <a:rPr lang="en-US" smtClean="0"/>
+              <a:t>9</a:t>
+            </a:fld>
+            <a:endParaRPr lang="en-US"/>
+          </a:p>
+        </p:txBody>
+      </p:sp>
+    </p:spTree>
+    <p:extLst>
+      <p:ext uri="{BB962C8B-B14F-4D97-AF65-F5344CB8AC3E}">
+        <p14:creationId xmlns:p14="http://schemas.microsoft.com/office/powerpoint/2010/main" val="3025524449"/>
       </p:ext>
     </p:extLst>
   </p:cSld>
@@ -986,7 +2112,7 @@
           <a:p>
             <a:fld id="{0459C166-16D3-4A25-A2F8-C51E0E346B22}" type="datetimeFigureOut">
               <a:rPr lang="en-US" smtClean="0"/>
-              <a:t>5/23/2016</a:t>
+              <a:t>6/22/2016</a:t>
             </a:fld>
             <a:endParaRPr lang="en-US"/>
           </a:p>
@@ -1081,7 +2207,7 @@
           <a:p>
             <a:fld id="{0459C166-16D3-4A25-A2F8-C51E0E346B22}" type="datetimeFigureOut">
               <a:rPr lang="en-US" smtClean="0"/>
-              <a:t>5/23/2016</a:t>
+              <a:t>6/22/2016</a:t>
             </a:fld>
             <a:endParaRPr lang="en-US"/>
           </a:p>
@@ -1356,7 +2482,7 @@
           <a:p>
             <a:fld id="{0459C166-16D3-4A25-A2F8-C51E0E346B22}" type="datetimeFigureOut">
               <a:rPr lang="en-US" smtClean="0"/>
-              <a:t>5/23/2016</a:t>
+              <a:t>6/22/2016</a:t>
             </a:fld>
             <a:endParaRPr lang="en-US"/>
           </a:p>
@@ -1608,7 +2734,7 @@
           <a:p>
             <a:fld id="{0459C166-16D3-4A25-A2F8-C51E0E346B22}" type="datetimeFigureOut">
               <a:rPr lang="en-US" smtClean="0"/>
-              <a:t>5/23/2016</a:t>
+              <a:t>6/22/2016</a:t>
             </a:fld>
             <a:endParaRPr lang="en-US"/>
           </a:p>
@@ -1776,7 +2902,7 @@
           <a:p>
             <a:fld id="{0459C166-16D3-4A25-A2F8-C51E0E346B22}" type="datetimeFigureOut">
               <a:rPr lang="en-US" smtClean="0"/>
-              <a:t>5/23/2016</a:t>
+              <a:t>6/22/2016</a:t>
             </a:fld>
             <a:endParaRPr lang="en-US"/>
           </a:p>
@@ -1954,7 +3080,7 @@
           <a:p>
             <a:fld id="{0459C166-16D3-4A25-A2F8-C51E0E346B22}" type="datetimeFigureOut">
               <a:rPr lang="en-US" smtClean="0"/>
-              <a:t>5/23/2016</a:t>
+              <a:t>6/22/2016</a:t>
             </a:fld>
             <a:endParaRPr lang="en-US"/>
           </a:p>
@@ -3881,7 +5007,7 @@
           <a:p>
             <a:fld id="{0459C166-16D3-4A25-A2F8-C51E0E346B22}" type="datetimeFigureOut">
               <a:rPr lang="en-US" smtClean="0"/>
-              <a:t>5/23/2016</a:t>
+              <a:t>6/22/2016</a:t>
             </a:fld>
             <a:endParaRPr lang="en-US"/>
           </a:p>
@@ -9508,7 +10634,7 @@
             <a:fld id="{0459C166-16D3-4A25-A2F8-C51E0E346B22}" type="datetimeFigureOut">
               <a:rPr lang="en-US" smtClean="0"/>
               <a:pPr/>
-              <a:t>5/23/2016</a:t>
+              <a:t>6/22/2016</a:t>
             </a:fld>
             <a:endParaRPr lang="en-US"/>
           </a:p>
@@ -13570,7 +14696,7 @@
           <a:p>
             <a:fld id="{0459C166-16D3-4A25-A2F8-C51E0E346B22}" type="datetimeFigureOut">
               <a:rPr lang="en-US" smtClean="0"/>
-              <a:t>5/23/2016</a:t>
+              <a:t>6/22/2016</a:t>
             </a:fld>
             <a:endParaRPr lang="en-US"/>
           </a:p>
@@ -13934,7 +15060,7 @@
           <a:p>
             <a:fld id="{0459C166-16D3-4A25-A2F8-C51E0E346B22}" type="datetimeFigureOut">
               <a:rPr lang="en-US" smtClean="0"/>
-              <a:t>5/23/2016</a:t>
+              <a:t>6/22/2016</a:t>
             </a:fld>
             <a:endParaRPr lang="en-US"/>
           </a:p>
@@ -14051,7 +15177,7 @@
           <a:p>
             <a:fld id="{0459C166-16D3-4A25-A2F8-C51E0E346B22}" type="datetimeFigureOut">
               <a:rPr lang="en-US" smtClean="0"/>
-              <a:t>5/23/2016</a:t>
+              <a:t>6/22/2016</a:t>
             </a:fld>
             <a:endParaRPr lang="en-US"/>
           </a:p>
@@ -14262,7 +15388,7 @@
           <a:p>
             <a:fld id="{0459C166-16D3-4A25-A2F8-C51E0E346B22}" type="datetimeFigureOut">
               <a:rPr lang="en-US" smtClean="0"/>
-              <a:t>5/23/2016</a:t>
+              <a:t>6/22/2016</a:t>
             </a:fld>
             <a:endParaRPr lang="en-US"/>
           </a:p>
@@ -15846,7 +16972,7 @@
           <p:nvPr/>
         </p:nvPicPr>
         <p:blipFill>
-          <a:blip r:embed="rId2"/>
+          <a:blip r:embed="rId3"/>
           <a:stretch>
             <a:fillRect/>
           </a:stretch>
@@ -16210,7 +17336,7 @@
           <p:nvPr/>
         </p:nvPicPr>
         <p:blipFill>
-          <a:blip r:embed="rId2"/>
+          <a:blip r:embed="rId3"/>
           <a:stretch>
             <a:fillRect/>
           </a:stretch>
@@ -16491,7 +17617,7 @@
           <p:nvPr/>
         </p:nvPicPr>
         <p:blipFill>
-          <a:blip r:embed="rId2"/>
+          <a:blip r:embed="rId3"/>
           <a:stretch>
             <a:fillRect/>
           </a:stretch>
@@ -16597,7 +17723,7 @@
           <p:nvPr/>
         </p:nvPicPr>
         <p:blipFill>
-          <a:blip r:embed="rId2"/>
+          <a:blip r:embed="rId3"/>
           <a:stretch>
             <a:fillRect/>
           </a:stretch>
@@ -18912,7 +20038,7 @@
           <p:nvPr/>
         </p:nvPicPr>
         <p:blipFill>
-          <a:blip r:embed="rId2">
+          <a:blip r:embed="rId3">
             <a:extLst>
               <a:ext uri="{28A0092B-C50C-407E-A947-70E740481C1C}">
                 <a14:useLocalDpi xmlns:a14="http://schemas.microsoft.com/office/drawing/2010/main" val="0"/>
@@ -19264,7 +20390,7 @@
           <p:nvPr/>
         </p:nvPicPr>
         <p:blipFill>
-          <a:blip r:embed="rId2"/>
+          <a:blip r:embed="rId3"/>
           <a:stretch>
             <a:fillRect/>
           </a:stretch>
@@ -19467,7 +20593,7 @@
           <p:nvPr/>
         </p:nvPicPr>
         <p:blipFill>
-          <a:blip r:embed="rId2"/>
+          <a:blip r:embed="rId3"/>
           <a:stretch>
             <a:fillRect/>
           </a:stretch>
@@ -19717,11 +20843,7 @@
             </a:r>
             <a:r>
               <a:rPr lang="en-US" dirty="0"/>
-              <a:t> </a:t>
-            </a:r>
-            <a:r>
-              <a:rPr lang="en-US" dirty="0"/>
-              <a:t>= </a:t>
+              <a:t> = </a:t>
             </a:r>
             <a:r>
               <a:rPr lang="en-US" dirty="0" err="1"/>
@@ -20790,12 +21912,12 @@
               <a:buSzPct val="80000"/>
             </a:pPr>
             <a:r>
-              <a:rPr lang="en-US" sz="2800" dirty="0" smtClean="0">
+              <a:rPr lang="en-US" sz="2800" dirty="0" err="1" smtClean="0">
                 <a:solidFill>
                   <a:srgbClr val="5095D1"/>
                 </a:solidFill>
               </a:rPr>
-              <a:t>Tumbling Window</a:t>
+              <a:t>TumblingWindow</a:t>
             </a:r>
             <a:endParaRPr lang="en-US" sz="2800" dirty="0">
               <a:solidFill>
@@ -21604,12 +22726,12 @@
               <a:buSzPct val="80000"/>
             </a:pPr>
             <a:r>
-              <a:rPr lang="en-US" sz="2800" dirty="0" smtClean="0">
+              <a:rPr lang="en-US" sz="2800" dirty="0" err="1" smtClean="0">
                 <a:solidFill>
                   <a:srgbClr val="5095D1"/>
                 </a:solidFill>
               </a:rPr>
-              <a:t>Hopping Window</a:t>
+              <a:t>HoppingWindow</a:t>
             </a:r>
             <a:endParaRPr lang="en-US" sz="2800" dirty="0">
               <a:solidFill>
@@ -22568,12 +23690,12 @@
               <a:buSzPct val="80000"/>
             </a:pPr>
             <a:r>
-              <a:rPr lang="en-US" sz="2800" dirty="0" smtClean="0">
+              <a:rPr lang="en-US" sz="2800" dirty="0" err="1" smtClean="0">
                 <a:solidFill>
                   <a:srgbClr val="5095D1"/>
                 </a:solidFill>
               </a:rPr>
-              <a:t>Sliding Window</a:t>
+              <a:t>SlidingWindow</a:t>
             </a:r>
             <a:endParaRPr lang="en-US" sz="2800" dirty="0">
               <a:solidFill>

</xml_diff>